<commit_message>
17/03/2021 derste yapılan değişiklikler var
</commit_message>
<xml_diff>
--- a/Modul 5 - Modul Paket StringMetod HataYakalama.pptx
+++ b/Modul 5 - Modul Paket StringMetod HataYakalama.pptx
@@ -398,7 +398,7 @@
           <a:p>
             <a:fld id="{2BBD4467-8E30-49A5-BFFD-EE5ADFB6EE18}" type="datetimeFigureOut">
               <a:rPr lang="tr-TR" smtClean="0"/>
-              <a:t>15.03.2021</a:t>
+              <a:t>17.03.2021</a:t>
             </a:fld>
             <a:endParaRPr lang="tr-TR"/>
           </a:p>
@@ -596,7 +596,7 @@
           <a:p>
             <a:fld id="{2BBD4467-8E30-49A5-BFFD-EE5ADFB6EE18}" type="datetimeFigureOut">
               <a:rPr lang="tr-TR" smtClean="0"/>
-              <a:t>15.03.2021</a:t>
+              <a:t>17.03.2021</a:t>
             </a:fld>
             <a:endParaRPr lang="tr-TR"/>
           </a:p>
@@ -804,7 +804,7 @@
           <a:p>
             <a:fld id="{2BBD4467-8E30-49A5-BFFD-EE5ADFB6EE18}" type="datetimeFigureOut">
               <a:rPr lang="tr-TR" smtClean="0"/>
-              <a:t>15.03.2021</a:t>
+              <a:t>17.03.2021</a:t>
             </a:fld>
             <a:endParaRPr lang="tr-TR"/>
           </a:p>
@@ -1002,7 +1002,7 @@
           <a:p>
             <a:fld id="{2BBD4467-8E30-49A5-BFFD-EE5ADFB6EE18}" type="datetimeFigureOut">
               <a:rPr lang="tr-TR" smtClean="0"/>
-              <a:t>15.03.2021</a:t>
+              <a:t>17.03.2021</a:t>
             </a:fld>
             <a:endParaRPr lang="tr-TR"/>
           </a:p>
@@ -1277,7 +1277,7 @@
           <a:p>
             <a:fld id="{2BBD4467-8E30-49A5-BFFD-EE5ADFB6EE18}" type="datetimeFigureOut">
               <a:rPr lang="tr-TR" smtClean="0"/>
-              <a:t>15.03.2021</a:t>
+              <a:t>17.03.2021</a:t>
             </a:fld>
             <a:endParaRPr lang="tr-TR"/>
           </a:p>
@@ -1542,7 +1542,7 @@
           <a:p>
             <a:fld id="{2BBD4467-8E30-49A5-BFFD-EE5ADFB6EE18}" type="datetimeFigureOut">
               <a:rPr lang="tr-TR" smtClean="0"/>
-              <a:t>15.03.2021</a:t>
+              <a:t>17.03.2021</a:t>
             </a:fld>
             <a:endParaRPr lang="tr-TR"/>
           </a:p>
@@ -1954,7 +1954,7 @@
           <a:p>
             <a:fld id="{2BBD4467-8E30-49A5-BFFD-EE5ADFB6EE18}" type="datetimeFigureOut">
               <a:rPr lang="tr-TR" smtClean="0"/>
-              <a:t>15.03.2021</a:t>
+              <a:t>17.03.2021</a:t>
             </a:fld>
             <a:endParaRPr lang="tr-TR"/>
           </a:p>
@@ -2095,7 +2095,7 @@
           <a:p>
             <a:fld id="{2BBD4467-8E30-49A5-BFFD-EE5ADFB6EE18}" type="datetimeFigureOut">
               <a:rPr lang="tr-TR" smtClean="0"/>
-              <a:t>15.03.2021</a:t>
+              <a:t>17.03.2021</a:t>
             </a:fld>
             <a:endParaRPr lang="tr-TR"/>
           </a:p>
@@ -2208,7 +2208,7 @@
           <a:p>
             <a:fld id="{2BBD4467-8E30-49A5-BFFD-EE5ADFB6EE18}" type="datetimeFigureOut">
               <a:rPr lang="tr-TR" smtClean="0"/>
-              <a:t>15.03.2021</a:t>
+              <a:t>17.03.2021</a:t>
             </a:fld>
             <a:endParaRPr lang="tr-TR"/>
           </a:p>
@@ -2519,7 +2519,7 @@
           <a:p>
             <a:fld id="{2BBD4467-8E30-49A5-BFFD-EE5ADFB6EE18}" type="datetimeFigureOut">
               <a:rPr lang="tr-TR" smtClean="0"/>
-              <a:t>15.03.2021</a:t>
+              <a:t>17.03.2021</a:t>
             </a:fld>
             <a:endParaRPr lang="tr-TR"/>
           </a:p>
@@ -2807,7 +2807,7 @@
           <a:p>
             <a:fld id="{2BBD4467-8E30-49A5-BFFD-EE5ADFB6EE18}" type="datetimeFigureOut">
               <a:rPr lang="tr-TR" smtClean="0"/>
-              <a:t>15.03.2021</a:t>
+              <a:t>17.03.2021</a:t>
             </a:fld>
             <a:endParaRPr lang="tr-TR"/>
           </a:p>
@@ -3048,7 +3048,7 @@
           <a:p>
             <a:fld id="{2BBD4467-8E30-49A5-BFFD-EE5ADFB6EE18}" type="datetimeFigureOut">
               <a:rPr lang="tr-TR" smtClean="0"/>
-              <a:t>15.03.2021</a:t>
+              <a:t>17.03.2021</a:t>
             </a:fld>
             <a:endParaRPr lang="tr-TR"/>
           </a:p>
@@ -9611,6 +9611,10 @@
             </a:r>
           </a:p>
           <a:p>
+            <a:r>
+              <a:rPr lang="tr-TR" dirty="0"/>
+              <a:t/>
+            </a:r>
             <a:br>
               <a:rPr lang="tr-TR" dirty="0"/>
             </a:br>
@@ -10369,7 +10373,7 @@
         <p:spPr>
           <a:xfrm>
             <a:off x="376310" y="497617"/>
-            <a:ext cx="11581227" cy="1200329"/>
+            <a:ext cx="11581227" cy="4062651"/>
           </a:xfrm>
           <a:prstGeom prst="rect">
             <a:avLst/>
@@ -10390,7 +10394,55 @@
                 <a:effectLst/>
                 <a:latin typeface="Roboto"/>
               </a:rPr>
-              <a:t>Bilgisayarlar karakterleri sayı olarak saklar. Ve karakterler </a:t>
+              <a:t>Bilgisayarlar karakterleri sayı olarak saklar. </a:t>
+            </a:r>
+            <a:endParaRPr lang="tr-TR" b="0" i="0" dirty="0" smtClean="0">
+              <a:solidFill>
+                <a:srgbClr val="252525"/>
+              </a:solidFill>
+              <a:effectLst/>
+              <a:latin typeface="Roboto"/>
+            </a:endParaRPr>
+          </a:p>
+          <a:p>
+            <a:endParaRPr lang="tr-TR" dirty="0">
+              <a:solidFill>
+                <a:srgbClr val="252525"/>
+              </a:solidFill>
+              <a:latin typeface="Roboto"/>
+            </a:endParaRPr>
+          </a:p>
+          <a:p>
+            <a:r>
+              <a:rPr lang="tr-TR" b="0" i="0" dirty="0" smtClean="0">
+                <a:solidFill>
+                  <a:srgbClr val="252525"/>
+                </a:solidFill>
+                <a:effectLst/>
+                <a:latin typeface="Roboto"/>
+              </a:rPr>
+              <a:t>Karakterler;</a:t>
+            </a:r>
+          </a:p>
+          <a:p>
+            <a:r>
+              <a:rPr lang="tr-TR" dirty="0">
+                <a:solidFill>
+                  <a:srgbClr val="252525"/>
+                </a:solidFill>
+                <a:latin typeface="Roboto"/>
+              </a:rPr>
+              <a:t>	</a:t>
+            </a:r>
+            <a:r>
+              <a:rPr lang="tr-TR" b="0" i="0" dirty="0" smtClean="0">
+                <a:solidFill>
+                  <a:srgbClr val="252525"/>
+                </a:solidFill>
+                <a:effectLst/>
+                <a:latin typeface="Roboto"/>
+              </a:rPr>
+              <a:t> </a:t>
             </a:r>
             <a:r>
               <a:rPr lang="tr-TR" b="1" i="0" dirty="0" err="1">
@@ -10410,7 +10462,54 @@
                 <a:effectLst/>
                 <a:latin typeface="Open Sans"/>
               </a:rPr>
-              <a:t> ve </a:t>
+              <a:t> </a:t>
+            </a:r>
+            <a:endParaRPr lang="tr-TR" b="1" i="0" dirty="0" smtClean="0">
+              <a:solidFill>
+                <a:srgbClr val="222222"/>
+              </a:solidFill>
+              <a:effectLst/>
+              <a:latin typeface="Open Sans"/>
+            </a:endParaRPr>
+          </a:p>
+          <a:p>
+            <a:r>
+              <a:rPr lang="tr-TR" b="1" dirty="0">
+                <a:solidFill>
+                  <a:srgbClr val="222222"/>
+                </a:solidFill>
+                <a:latin typeface="Open Sans"/>
+              </a:rPr>
+              <a:t>	</a:t>
+            </a:r>
+            <a:r>
+              <a:rPr lang="tr-TR" b="1" dirty="0" smtClean="0">
+                <a:solidFill>
+                  <a:srgbClr val="222222"/>
+                </a:solidFill>
+                <a:latin typeface="Open Sans"/>
+              </a:rPr>
+              <a:t> </a:t>
+            </a:r>
+            <a:r>
+              <a:rPr lang="tr-TR" b="1" i="0" dirty="0" err="1" smtClean="0">
+                <a:solidFill>
+                  <a:srgbClr val="222222"/>
+                </a:solidFill>
+                <a:effectLst/>
+                <a:latin typeface="Open Sans"/>
+              </a:rPr>
+              <a:t>control</a:t>
+            </a:r>
+            <a:r>
+              <a:rPr lang="tr-TR" b="1" i="0" dirty="0" smtClean="0">
+                <a:solidFill>
+                  <a:srgbClr val="222222"/>
+                </a:solidFill>
+                <a:effectLst/>
+                <a:latin typeface="Open Sans"/>
+              </a:rPr>
+              <a:t> </a:t>
             </a:r>
             <a:r>
               <a:rPr lang="tr-TR" b="1" i="0" dirty="0" err="1">
@@ -10420,7 +10519,7 @@
                 <a:effectLst/>
                 <a:latin typeface="Open Sans"/>
               </a:rPr>
-              <a:t>control</a:t>
+              <a:t>characters</a:t>
             </a:r>
             <a:r>
               <a:rPr lang="tr-TR" b="1" i="0" dirty="0">
@@ -10430,37 +10529,44 @@
                 <a:effectLst/>
                 <a:latin typeface="Open Sans"/>
               </a:rPr>
-              <a:t> </a:t>
-            </a:r>
-            <a:r>
-              <a:rPr lang="tr-TR" b="1" i="0" dirty="0" err="1">
+              <a:t> ( giriş - çıkış cihazlarını kontrol ederler ) </a:t>
+            </a:r>
+            <a:endParaRPr lang="tr-TR" b="1" i="0" dirty="0" smtClean="0">
+              <a:solidFill>
+                <a:srgbClr val="222222"/>
+              </a:solidFill>
+              <a:effectLst/>
+              <a:latin typeface="Open Sans"/>
+            </a:endParaRPr>
+          </a:p>
+          <a:p>
+            <a:endParaRPr lang="tr-TR" b="1" dirty="0">
+              <a:solidFill>
+                <a:srgbClr val="222222"/>
+              </a:solidFill>
+              <a:latin typeface="Open Sans"/>
+            </a:endParaRPr>
+          </a:p>
+          <a:p>
+            <a:r>
+              <a:rPr lang="tr-TR" i="0" dirty="0" smtClean="0">
                 <a:solidFill>
                   <a:srgbClr val="222222"/>
                 </a:solidFill>
                 <a:effectLst/>
                 <a:latin typeface="Open Sans"/>
               </a:rPr>
-              <a:t>characters</a:t>
-            </a:r>
-            <a:r>
-              <a:rPr lang="tr-TR" b="1" i="0" dirty="0">
+              <a:t>olarak </a:t>
+            </a:r>
+            <a:r>
+              <a:rPr lang="tr-TR" i="0" dirty="0">
                 <a:solidFill>
                   <a:srgbClr val="222222"/>
                 </a:solidFill>
                 <a:effectLst/>
                 <a:latin typeface="Open Sans"/>
               </a:rPr>
-              <a:t> ( giriş - çıkış cihazlarını kontrol ederler ) </a:t>
-            </a:r>
-            <a:r>
-              <a:rPr lang="tr-TR" i="0" dirty="0">
-                <a:solidFill>
-                  <a:srgbClr val="222222"/>
-                </a:solidFill>
-                <a:effectLst/>
-                <a:latin typeface="Open Sans"/>
-              </a:rPr>
-              <a:t>olarak ikiye ayrılır.</a:t>
+              <a:t>ikiye ayrılır.</a:t>
             </a:r>
           </a:p>
           <a:p>
@@ -10479,7 +10585,128 @@
                 </a:solidFill>
                 <a:latin typeface="Open Sans"/>
               </a:rPr>
-              <a:t>Farklı bilgisayarlar farklı kodlama kullanır.</a:t>
+              <a:t>Farklı bilgisayarlar farklı kodlama </a:t>
+            </a:r>
+            <a:r>
+              <a:rPr lang="tr-TR" dirty="0" smtClean="0">
+                <a:solidFill>
+                  <a:srgbClr val="222222"/>
+                </a:solidFill>
+                <a:latin typeface="Open Sans"/>
+              </a:rPr>
+              <a:t>yöntemi kullanır.</a:t>
+            </a:r>
+          </a:p>
+          <a:p>
+            <a:endParaRPr lang="tr-TR" dirty="0" smtClean="0">
+              <a:solidFill>
+                <a:srgbClr val="222222"/>
+              </a:solidFill>
+              <a:latin typeface="Open Sans"/>
+            </a:endParaRPr>
+          </a:p>
+          <a:p>
+            <a:endParaRPr lang="tr-TR" dirty="0">
+              <a:solidFill>
+                <a:srgbClr val="222222"/>
+              </a:solidFill>
+              <a:latin typeface="Open Sans"/>
+            </a:endParaRPr>
+          </a:p>
+          <a:p>
+            <a:r>
+              <a:rPr lang="tr-TR" b="1" dirty="0" err="1" smtClean="0">
+                <a:solidFill>
+                  <a:srgbClr val="222222"/>
+                </a:solidFill>
+                <a:latin typeface="Open Sans"/>
+              </a:rPr>
+              <a:t>Code</a:t>
+            </a:r>
+            <a:r>
+              <a:rPr lang="tr-TR" b="1" dirty="0" smtClean="0">
+                <a:solidFill>
+                  <a:srgbClr val="222222"/>
+                </a:solidFill>
+                <a:latin typeface="Open Sans"/>
+              </a:rPr>
+              <a:t> </a:t>
+            </a:r>
+            <a:r>
+              <a:rPr lang="tr-TR" b="1" dirty="0" err="1" smtClean="0">
+                <a:solidFill>
+                  <a:srgbClr val="222222"/>
+                </a:solidFill>
+                <a:latin typeface="Open Sans"/>
+              </a:rPr>
+              <a:t>point</a:t>
+            </a:r>
+            <a:r>
+              <a:rPr lang="tr-TR" b="1" dirty="0" smtClean="0">
+                <a:solidFill>
+                  <a:srgbClr val="222222"/>
+                </a:solidFill>
+                <a:latin typeface="Open Sans"/>
+              </a:rPr>
+              <a:t> ( kod noktası ) </a:t>
+            </a:r>
+            <a:r>
+              <a:rPr lang="tr-TR" dirty="0" smtClean="0">
+                <a:solidFill>
+                  <a:srgbClr val="222222"/>
+                </a:solidFill>
+                <a:latin typeface="Open Sans"/>
+              </a:rPr>
+              <a:t>: </a:t>
+            </a:r>
+            <a:r>
+              <a:rPr lang="tr-TR" dirty="0"/>
+              <a:t>Bir kod noktası, bir karakter oluşturan bir </a:t>
+            </a:r>
+            <a:r>
+              <a:rPr lang="tr-TR" dirty="0" smtClean="0"/>
+              <a:t>sayıdır.</a:t>
+            </a:r>
+          </a:p>
+          <a:p>
+            <a:endParaRPr lang="tr-TR" dirty="0"/>
+          </a:p>
+          <a:p>
+            <a:r>
+              <a:rPr lang="tr-TR" sz="2400" b="1" dirty="0" err="1" smtClean="0"/>
+              <a:t>Code</a:t>
+            </a:r>
+            <a:r>
+              <a:rPr lang="tr-TR" sz="2400" b="1" dirty="0" smtClean="0"/>
+              <a:t> </a:t>
+            </a:r>
+            <a:r>
+              <a:rPr lang="tr-TR" sz="2400" b="1" dirty="0" err="1" smtClean="0"/>
+              <a:t>page</a:t>
+            </a:r>
+            <a:r>
+              <a:rPr lang="tr-TR" sz="2400" b="1" dirty="0" smtClean="0"/>
+              <a:t> </a:t>
+            </a:r>
+            <a:r>
+              <a:rPr lang="tr-TR" dirty="0" smtClean="0"/>
+              <a:t>: </a:t>
+            </a:r>
+            <a:r>
+              <a:rPr lang="tr-TR" dirty="0" err="1" smtClean="0"/>
+              <a:t>Code</a:t>
+            </a:r>
+            <a:r>
+              <a:rPr lang="tr-TR" dirty="0" smtClean="0"/>
+              <a:t> </a:t>
+            </a:r>
+            <a:r>
+              <a:rPr lang="tr-TR" dirty="0" err="1" smtClean="0"/>
+              <a:t>pointlerin</a:t>
+            </a:r>
+            <a:r>
+              <a:rPr lang="tr-TR" dirty="0" smtClean="0"/>
+              <a:t> farklı diller için farklı şekillerde ayarlanmasıdır.</a:t>
             </a:r>
             <a:endParaRPr lang="tr-TR" dirty="0"/>
           </a:p>
@@ -10551,6 +10778,36 @@
           </a:prstGeom>
         </p:spPr>
       </p:pic>
+      <p:sp>
+        <p:nvSpPr>
+          <p:cNvPr id="2" name="Metin kutusu 1"/>
+          <p:cNvSpPr txBox="1"/>
+          <p:nvPr/>
+        </p:nvSpPr>
+        <p:spPr>
+          <a:xfrm>
+            <a:off x="192505" y="2346158"/>
+            <a:ext cx="1484061" cy="400110"/>
+          </a:xfrm>
+          <a:prstGeom prst="rect">
+            <a:avLst/>
+          </a:prstGeom>
+          <a:noFill/>
+        </p:spPr>
+        <p:txBody>
+          <a:bodyPr wrap="none" rtlCol="0">
+            <a:spAutoFit/>
+          </a:bodyPr>
+          <a:lstStyle/>
+          <a:p>
+            <a:r>
+              <a:rPr lang="tr-TR" sz="2000" dirty="0" smtClean="0"/>
+              <a:t>ASCII kodları</a:t>
+            </a:r>
+            <a:endParaRPr lang="tr-TR" sz="2000" dirty="0"/>
+          </a:p>
+        </p:txBody>
+      </p:sp>
     </p:spTree>
     <p:extLst>
       <p:ext uri="{BB962C8B-B14F-4D97-AF65-F5344CB8AC3E}">
@@ -11719,8 +11976,8 @@
         </p:nvSpPr>
         <p:spPr>
           <a:xfrm>
-            <a:off x="478302" y="576775"/>
-            <a:ext cx="4797083" cy="1477328"/>
+            <a:off x="1946155" y="1274607"/>
+            <a:ext cx="4797083" cy="4524315"/>
           </a:xfrm>
           <a:prstGeom prst="rect">
             <a:avLst/>
@@ -11734,38 +11991,43 @@
           <a:lstStyle/>
           <a:p>
             <a:r>
-              <a:rPr lang="tr-TR" dirty="0" err="1"/>
+              <a:rPr lang="tr-TR" sz="4800" dirty="0" err="1"/>
               <a:t>try</a:t>
             </a:r>
             <a:r>
-              <a:rPr lang="tr-TR" dirty="0"/>
+              <a:rPr lang="tr-TR" sz="4800" dirty="0"/>
               <a:t>:</a:t>
             </a:r>
           </a:p>
           <a:p>
             <a:r>
-              <a:rPr lang="tr-TR" dirty="0"/>
+              <a:rPr lang="tr-TR" sz="4800" dirty="0"/>
               <a:t>	kod</a:t>
             </a:r>
           </a:p>
           <a:p>
             <a:r>
-              <a:rPr lang="tr-TR" dirty="0" err="1"/>
-              <a:t>exept</a:t>
-            </a:r>
-            <a:r>
-              <a:rPr lang="tr-TR" dirty="0"/>
+              <a:rPr lang="tr-TR" sz="4800" dirty="0" err="1" smtClean="0"/>
+              <a:t>except</a:t>
+            </a:r>
+            <a:r>
+              <a:rPr lang="tr-TR" sz="4800" dirty="0"/>
               <a:t>:</a:t>
             </a:r>
           </a:p>
           <a:p>
             <a:r>
-              <a:rPr lang="tr-TR" dirty="0"/>
-              <a:t>	hata olursa kod</a:t>
-            </a:r>
-          </a:p>
-          <a:p>
-            <a:endParaRPr lang="tr-TR" dirty="0"/>
+              <a:rPr lang="tr-TR" sz="4800" dirty="0"/>
+              <a:t>	hata olursa </a:t>
+            </a:r>
+            <a:r>
+              <a:rPr lang="tr-TR" sz="4800" dirty="0" smtClean="0"/>
+              <a:t>	kod</a:t>
+            </a:r>
+            <a:endParaRPr lang="tr-TR" sz="4800" dirty="0"/>
+          </a:p>
+          <a:p>
+            <a:endParaRPr lang="tr-TR" sz="4800" dirty="0"/>
           </a:p>
         </p:txBody>
       </p:sp>
@@ -11827,8 +12089,8 @@
         </p:blipFill>
         <p:spPr>
           <a:xfrm>
-            <a:off x="2040349" y="1201611"/>
-            <a:ext cx="8111302" cy="4454778"/>
+            <a:off x="991619" y="625642"/>
+            <a:ext cx="10384020" cy="5702969"/>
           </a:xfrm>
           <a:prstGeom prst="rect">
             <a:avLst/>
@@ -12020,8 +12282,8 @@
         </p:nvSpPr>
         <p:spPr>
           <a:xfrm>
-            <a:off x="8384345" y="154745"/>
-            <a:ext cx="3615397" cy="3139321"/>
+            <a:off x="1852863" y="794084"/>
+            <a:ext cx="8269953" cy="4832092"/>
           </a:xfrm>
           <a:prstGeom prst="rect">
             <a:avLst/>
@@ -12035,110 +12297,110 @@
           <a:lstStyle/>
           <a:p>
             <a:r>
-              <a:rPr lang="tr-TR" dirty="0" err="1"/>
+              <a:rPr lang="tr-TR" sz="2800" dirty="0" err="1"/>
               <a:t>try</a:t>
             </a:r>
             <a:r>
-              <a:rPr lang="tr-TR" dirty="0"/>
+              <a:rPr lang="tr-TR" sz="2800" dirty="0"/>
               <a:t>:</a:t>
             </a:r>
           </a:p>
           <a:p>
             <a:r>
-              <a:rPr lang="tr-TR" dirty="0"/>
+              <a:rPr lang="tr-TR" sz="2800" dirty="0"/>
               <a:t>	kod</a:t>
             </a:r>
           </a:p>
           <a:p>
             <a:r>
-              <a:rPr lang="tr-TR" dirty="0" err="1"/>
+              <a:rPr lang="tr-TR" sz="2800" dirty="0" err="1"/>
               <a:t>except</a:t>
             </a:r>
             <a:r>
-              <a:rPr lang="tr-TR" dirty="0"/>
+              <a:rPr lang="tr-TR" sz="2800" dirty="0"/>
               <a:t> </a:t>
             </a:r>
             <a:r>
-              <a:rPr lang="tr-TR" dirty="0" err="1"/>
+              <a:rPr lang="tr-TR" sz="2800" dirty="0" err="1"/>
               <a:t>ZeroDivisionError</a:t>
             </a:r>
             <a:r>
-              <a:rPr lang="tr-TR" dirty="0"/>
+              <a:rPr lang="tr-TR" sz="2800" dirty="0"/>
               <a:t>:</a:t>
             </a:r>
           </a:p>
           <a:p>
             <a:r>
-              <a:rPr lang="tr-TR" dirty="0"/>
+              <a:rPr lang="tr-TR" sz="2800" dirty="0"/>
               <a:t>	 hata olursa kod</a:t>
             </a:r>
           </a:p>
           <a:p>
             <a:r>
-              <a:rPr lang="tr-TR" dirty="0" err="1"/>
+              <a:rPr lang="tr-TR" sz="2800" dirty="0" err="1"/>
               <a:t>except</a:t>
             </a:r>
             <a:r>
-              <a:rPr lang="tr-TR" dirty="0"/>
+              <a:rPr lang="tr-TR" sz="2800" dirty="0"/>
               <a:t> </a:t>
             </a:r>
             <a:r>
-              <a:rPr lang="tr-TR" dirty="0" err="1"/>
+              <a:rPr lang="tr-TR" sz="2800" dirty="0" err="1"/>
               <a:t>ValueError</a:t>
             </a:r>
             <a:r>
-              <a:rPr lang="tr-TR" dirty="0"/>
+              <a:rPr lang="tr-TR" sz="2800" dirty="0"/>
               <a:t>:</a:t>
             </a:r>
           </a:p>
           <a:p>
             <a:r>
-              <a:rPr lang="tr-TR" dirty="0"/>
+              <a:rPr lang="tr-TR" sz="2800" dirty="0"/>
               <a:t>	 hata olursa kod</a:t>
             </a:r>
           </a:p>
           <a:p>
             <a:r>
-              <a:rPr lang="tr-TR" dirty="0" err="1"/>
+              <a:rPr lang="tr-TR" sz="2800" dirty="0" err="1"/>
               <a:t>except</a:t>
             </a:r>
             <a:r>
-              <a:rPr lang="tr-TR" dirty="0"/>
+              <a:rPr lang="tr-TR" sz="2800" dirty="0"/>
               <a:t> </a:t>
             </a:r>
             <a:r>
-              <a:rPr lang="tr-TR" dirty="0" err="1"/>
+              <a:rPr lang="tr-TR" sz="2800" dirty="0" err="1"/>
               <a:t>IndexingError</a:t>
             </a:r>
             <a:r>
-              <a:rPr lang="tr-TR" dirty="0"/>
+              <a:rPr lang="tr-TR" sz="2800" dirty="0"/>
               <a:t>:</a:t>
             </a:r>
           </a:p>
           <a:p>
             <a:r>
-              <a:rPr lang="tr-TR" dirty="0"/>
+              <a:rPr lang="tr-TR" sz="2800" dirty="0"/>
               <a:t>	 hata olursa kod</a:t>
             </a:r>
           </a:p>
           <a:p>
             <a:r>
-              <a:rPr lang="tr-TR" dirty="0" err="1"/>
+              <a:rPr lang="tr-TR" sz="2800" dirty="0" err="1"/>
               <a:t>except</a:t>
             </a:r>
             <a:r>
-              <a:rPr lang="tr-TR" dirty="0"/>
+              <a:rPr lang="tr-TR" sz="2800" dirty="0"/>
               <a:t>:</a:t>
             </a:r>
           </a:p>
           <a:p>
             <a:r>
-              <a:rPr lang="tr-TR" dirty="0"/>
+              <a:rPr lang="tr-TR" sz="2800" dirty="0"/>
               <a:t>	 hata olursa kod</a:t>
             </a:r>
           </a:p>
           <a:p>
-            <a:endParaRPr lang="tr-TR" dirty="0"/>
+            <a:endParaRPr lang="tr-TR" sz="2800" dirty="0"/>
           </a:p>
         </p:txBody>
       </p:sp>
@@ -12186,8 +12448,8 @@
         </p:nvSpPr>
         <p:spPr>
           <a:xfrm>
-            <a:off x="7906043" y="4203733"/>
-            <a:ext cx="3108960" cy="1200329"/>
+            <a:off x="1852863" y="794084"/>
+            <a:ext cx="9071811" cy="3046988"/>
           </a:xfrm>
           <a:prstGeom prst="rect">
             <a:avLst/>
@@ -12202,7 +12464,7 @@
           <a:p>
             <a:pPr algn="l"/>
             <a:r>
-              <a:rPr lang="tr-TR" b="0" i="0" dirty="0" err="1">
+              <a:rPr lang="tr-TR" sz="4800" b="0" i="0" dirty="0" err="1">
                 <a:solidFill>
                   <a:srgbClr val="0000FF"/>
                 </a:solidFill>
@@ -12212,7 +12474,7 @@
               <a:t>try</a:t>
             </a:r>
             <a:r>
-              <a:rPr lang="tr-TR" b="0" i="0" dirty="0">
+              <a:rPr lang="tr-TR" sz="4800" b="0" i="0" dirty="0">
                 <a:solidFill>
                   <a:srgbClr val="000000"/>
                 </a:solidFill>
@@ -12225,20 +12487,47 @@
           <a:p>
             <a:pPr algn="l"/>
             <a:r>
-              <a:rPr lang="tr-TR" b="0" i="0" dirty="0">
+              <a:rPr lang="tr-TR" sz="4800" b="0" i="0" dirty="0" smtClean="0">
                 <a:solidFill>
                   <a:srgbClr val="000000"/>
                 </a:solidFill>
                 <a:effectLst/>
                 <a:latin typeface="courier new" panose="02070309020205020404" pitchFamily="49" charset="0"/>
               </a:rPr>
-              <a:t>: </a:t>
-            </a:r>
+              <a:t>	</a:t>
+            </a:r>
+            <a:r>
+              <a:rPr lang="tr-TR" sz="4800" b="0" i="0" dirty="0" err="1" smtClean="0">
+                <a:solidFill>
+                  <a:srgbClr val="000000"/>
+                </a:solidFill>
+                <a:effectLst/>
+                <a:latin typeface="courier new" panose="02070309020205020404" pitchFamily="49" charset="0"/>
+              </a:rPr>
+              <a:t>code</a:t>
+            </a:r>
+            <a:r>
+              <a:rPr lang="tr-TR" sz="4800" b="0" i="0" dirty="0" smtClean="0">
+                <a:solidFill>
+                  <a:srgbClr val="000000"/>
+                </a:solidFill>
+                <a:effectLst/>
+                <a:latin typeface="courier new" panose="02070309020205020404" pitchFamily="49" charset="0"/>
+              </a:rPr>
+              <a:t> </a:t>
+            </a:r>
+            <a:endParaRPr lang="tr-TR" sz="4800" b="0" i="0" dirty="0">
+              <a:solidFill>
+                <a:srgbClr val="000000"/>
+              </a:solidFill>
+              <a:effectLst/>
+              <a:latin typeface="courier new" panose="02070309020205020404" pitchFamily="49" charset="0"/>
+            </a:endParaRPr>
           </a:p>
           <a:p>
             <a:pPr algn="l"/>
             <a:r>
-              <a:rPr lang="tr-TR" b="0" i="0" dirty="0" err="1">
+              <a:rPr lang="tr-TR" sz="4800" b="0" i="0" dirty="0" err="1">
                 <a:solidFill>
                   <a:srgbClr val="0000FF"/>
                 </a:solidFill>
@@ -12248,7 +12537,7 @@
               <a:t>except</a:t>
             </a:r>
             <a:r>
-              <a:rPr lang="tr-TR" b="0" i="0" dirty="0">
+              <a:rPr lang="tr-TR" sz="4800" b="0" i="0" dirty="0">
                 <a:solidFill>
                   <a:srgbClr val="000000"/>
                 </a:solidFill>
@@ -12261,15 +12550,30 @@
           <a:p>
             <a:pPr algn="l"/>
             <a:r>
-              <a:rPr lang="tr-TR" b="0" i="0" dirty="0">
+              <a:rPr lang="tr-TR" sz="4800" dirty="0">
                 <a:solidFill>
                   <a:srgbClr val="000000"/>
                 </a:solidFill>
-                <a:effectLst/>
                 <a:latin typeface="courier new" panose="02070309020205020404" pitchFamily="49" charset="0"/>
               </a:rPr>
-              <a:t>:</a:t>
-            </a:r>
+              <a:t>	</a:t>
+            </a:r>
+            <a:r>
+              <a:rPr lang="tr-TR" sz="4800" dirty="0" err="1" smtClean="0">
+                <a:solidFill>
+                  <a:srgbClr val="000000"/>
+                </a:solidFill>
+                <a:latin typeface="courier new" panose="02070309020205020404" pitchFamily="49" charset="0"/>
+              </a:rPr>
+              <a:t>code</a:t>
+            </a:r>
+            <a:endParaRPr lang="tr-TR" sz="4800" b="0" i="0" dirty="0">
+              <a:solidFill>
+                <a:srgbClr val="000000"/>
+              </a:solidFill>
+              <a:effectLst/>
+              <a:latin typeface="courier new" panose="02070309020205020404" pitchFamily="49" charset="0"/>
+            </a:endParaRPr>
           </a:p>
         </p:txBody>
       </p:sp>
@@ -12562,7 +12866,7 @@
         </p:nvSpPr>
         <p:spPr>
           <a:xfrm>
-            <a:off x="404445" y="305024"/>
+            <a:off x="404445" y="325652"/>
             <a:ext cx="8430065" cy="646331"/>
           </a:xfrm>
           <a:prstGeom prst="rect">
@@ -14722,7 +15026,19 @@
             </a:r>
             <a:r>
               <a:rPr lang="tr-TR" sz="2400" b="1" dirty="0"/>
-              <a:t> ( ad uzayı ) : </a:t>
+              <a:t> ( </a:t>
+            </a:r>
+            <a:r>
+              <a:rPr lang="tr-TR" sz="2400" b="1"/>
+              <a:t>ad </a:t>
+            </a:r>
+            <a:r>
+              <a:rPr lang="tr-TR" sz="2400" b="1" smtClean="0"/>
+              <a:t>uzayı-alanı </a:t>
+            </a:r>
+            <a:r>
+              <a:rPr lang="tr-TR" sz="2400" b="1" dirty="0"/>
+              <a:t>) : </a:t>
             </a:r>
           </a:p>
           <a:p>

</xml_diff>

<commit_message>
Derste yapılan değişiklikleri de içerir.
</commit_message>
<xml_diff>
--- a/Modul 5 - Modul Paket StringMetod HataYakalama.pptx
+++ b/Modul 5 - Modul Paket StringMetod HataYakalama.pptx
@@ -9611,10 +9611,6 @@
             </a:r>
           </a:p>
           <a:p>
-            <a:r>
-              <a:rPr lang="tr-TR" dirty="0"/>
-              <a:t/>
-            </a:r>
             <a:br>
               <a:rPr lang="tr-TR" dirty="0"/>
             </a:br>
@@ -10396,13 +10392,6 @@
               </a:rPr>
               <a:t>Bilgisayarlar karakterleri sayı olarak saklar. </a:t>
             </a:r>
-            <a:endParaRPr lang="tr-TR" b="0" i="0" dirty="0" smtClean="0">
-              <a:solidFill>
-                <a:srgbClr val="252525"/>
-              </a:solidFill>
-              <a:effectLst/>
-              <a:latin typeface="Roboto"/>
-            </a:endParaRPr>
           </a:p>
           <a:p>
             <a:endParaRPr lang="tr-TR" dirty="0">
@@ -10414,7 +10403,7 @@
           </a:p>
           <a:p>
             <a:r>
-              <a:rPr lang="tr-TR" b="0" i="0" dirty="0" smtClean="0">
+              <a:rPr lang="tr-TR" b="0" i="0" dirty="0">
                 <a:solidFill>
                   <a:srgbClr val="252525"/>
                 </a:solidFill>
@@ -10435,7 +10424,7 @@
               <a:t>	</a:t>
             </a:r>
             <a:r>
-              <a:rPr lang="tr-TR" b="0" i="0" dirty="0" smtClean="0">
+              <a:rPr lang="tr-TR" b="0" i="0" dirty="0">
                 <a:solidFill>
                   <a:srgbClr val="252525"/>
                 </a:solidFill>
@@ -10464,13 +10453,6 @@
               </a:rPr>
               <a:t> </a:t>
             </a:r>
-            <a:endParaRPr lang="tr-TR" b="1" i="0" dirty="0" smtClean="0">
-              <a:solidFill>
-                <a:srgbClr val="222222"/>
-              </a:solidFill>
-              <a:effectLst/>
-              <a:latin typeface="Open Sans"/>
-            </a:endParaRPr>
           </a:p>
           <a:p>
             <a:r>
@@ -10480,64 +10462,48 @@
                 </a:solidFill>
                 <a:latin typeface="Open Sans"/>
               </a:rPr>
-              <a:t>	</a:t>
-            </a:r>
-            <a:r>
-              <a:rPr lang="tr-TR" b="1" dirty="0" smtClean="0">
+              <a:t>	 </a:t>
+            </a:r>
+            <a:r>
+              <a:rPr lang="tr-TR" b="1" i="0" dirty="0" err="1">
                 <a:solidFill>
                   <a:srgbClr val="222222"/>
                 </a:solidFill>
+                <a:effectLst/>
                 <a:latin typeface="Open Sans"/>
               </a:rPr>
+              <a:t>control</a:t>
+            </a:r>
+            <a:r>
+              <a:rPr lang="tr-TR" b="1" i="0" dirty="0">
+                <a:solidFill>
+                  <a:srgbClr val="222222"/>
+                </a:solidFill>
+                <a:effectLst/>
+                <a:latin typeface="Open Sans"/>
+              </a:rPr>
               <a:t> </a:t>
             </a:r>
             <a:r>
-              <a:rPr lang="tr-TR" b="1" i="0" dirty="0" err="1" smtClean="0">
+              <a:rPr lang="tr-TR" b="1" i="0" dirty="0" err="1">
                 <a:solidFill>
                   <a:srgbClr val="222222"/>
                 </a:solidFill>
                 <a:effectLst/>
                 <a:latin typeface="Open Sans"/>
               </a:rPr>
-              <a:t>control</a:t>
-            </a:r>
-            <a:r>
-              <a:rPr lang="tr-TR" b="1" i="0" dirty="0" smtClean="0">
+              <a:t>characters</a:t>
+            </a:r>
+            <a:r>
+              <a:rPr lang="tr-TR" b="1" i="0" dirty="0">
                 <a:solidFill>
                   <a:srgbClr val="222222"/>
                 </a:solidFill>
                 <a:effectLst/>
                 <a:latin typeface="Open Sans"/>
               </a:rPr>
-              <a:t> </a:t>
-            </a:r>
-            <a:r>
-              <a:rPr lang="tr-TR" b="1" i="0" dirty="0" err="1">
-                <a:solidFill>
-                  <a:srgbClr val="222222"/>
-                </a:solidFill>
-                <a:effectLst/>
-                <a:latin typeface="Open Sans"/>
-              </a:rPr>
-              <a:t>characters</a:t>
-            </a:r>
-            <a:r>
-              <a:rPr lang="tr-TR" b="1" i="0" dirty="0">
-                <a:solidFill>
-                  <a:srgbClr val="222222"/>
-                </a:solidFill>
-                <a:effectLst/>
-                <a:latin typeface="Open Sans"/>
-              </a:rPr>
               <a:t> ( giriş - çıkış cihazlarını kontrol ederler ) </a:t>
             </a:r>
-            <a:endParaRPr lang="tr-TR" b="1" i="0" dirty="0" smtClean="0">
-              <a:solidFill>
-                <a:srgbClr val="222222"/>
-              </a:solidFill>
-              <a:effectLst/>
-              <a:latin typeface="Open Sans"/>
-            </a:endParaRPr>
           </a:p>
           <a:p>
             <a:endParaRPr lang="tr-TR" b="1" dirty="0">
@@ -10549,24 +10515,14 @@
           </a:p>
           <a:p>
             <a:r>
-              <a:rPr lang="tr-TR" i="0" dirty="0" smtClean="0">
+              <a:rPr lang="tr-TR" i="0" dirty="0">
                 <a:solidFill>
                   <a:srgbClr val="222222"/>
                 </a:solidFill>
                 <a:effectLst/>
                 <a:latin typeface="Open Sans"/>
               </a:rPr>
-              <a:t>olarak </a:t>
-            </a:r>
-            <a:r>
-              <a:rPr lang="tr-TR" i="0" dirty="0">
-                <a:solidFill>
-                  <a:srgbClr val="222222"/>
-                </a:solidFill>
-                <a:effectLst/>
-                <a:latin typeface="Open Sans"/>
-              </a:rPr>
-              <a:t>ikiye ayrılır.</a:t>
+              <a:t>olarak ikiye ayrılır.</a:t>
             </a:r>
           </a:p>
           <a:p>
@@ -10585,25 +10541,8 @@
                 </a:solidFill>
                 <a:latin typeface="Open Sans"/>
               </a:rPr>
-              <a:t>Farklı bilgisayarlar farklı kodlama </a:t>
-            </a:r>
-            <a:r>
-              <a:rPr lang="tr-TR" dirty="0" smtClean="0">
-                <a:solidFill>
-                  <a:srgbClr val="222222"/>
-                </a:solidFill>
-                <a:latin typeface="Open Sans"/>
-              </a:rPr>
-              <a:t>yöntemi kullanır.</a:t>
-            </a:r>
-          </a:p>
-          <a:p>
-            <a:endParaRPr lang="tr-TR" dirty="0" smtClean="0">
-              <a:solidFill>
-                <a:srgbClr val="222222"/>
-              </a:solidFill>
-              <a:latin typeface="Open Sans"/>
-            </a:endParaRPr>
+              <a:t>Farklı bilgisayarlar farklı kodlama yöntemi kullanır.</a:t>
+            </a:r>
           </a:p>
           <a:p>
             <a:endParaRPr lang="tr-TR" dirty="0">
@@ -10614,8 +10553,16 @@
             </a:endParaRPr>
           </a:p>
           <a:p>
-            <a:r>
-              <a:rPr lang="tr-TR" b="1" dirty="0" err="1" smtClean="0">
+            <a:endParaRPr lang="tr-TR" dirty="0">
+              <a:solidFill>
+                <a:srgbClr val="222222"/>
+              </a:solidFill>
+              <a:latin typeface="Open Sans"/>
+            </a:endParaRPr>
+          </a:p>
+          <a:p>
+            <a:r>
+              <a:rPr lang="tr-TR" b="1" dirty="0" err="1">
                 <a:solidFill>
                   <a:srgbClr val="222222"/>
                 </a:solidFill>
@@ -10624,7 +10571,7 @@
               <a:t>Code</a:t>
             </a:r>
             <a:r>
-              <a:rPr lang="tr-TR" b="1" dirty="0" smtClean="0">
+              <a:rPr lang="tr-TR" b="1" dirty="0">
                 <a:solidFill>
                   <a:srgbClr val="222222"/>
                 </a:solidFill>
@@ -10633,7 +10580,7 @@
               <a:t> </a:t>
             </a:r>
             <a:r>
-              <a:rPr lang="tr-TR" b="1" dirty="0" err="1" smtClean="0">
+              <a:rPr lang="tr-TR" b="1" dirty="0" err="1">
                 <a:solidFill>
                   <a:srgbClr val="222222"/>
                 </a:solidFill>
@@ -10642,7 +10589,7 @@
               <a:t>point</a:t>
             </a:r>
             <a:r>
-              <a:rPr lang="tr-TR" b="1" dirty="0" smtClean="0">
+              <a:rPr lang="tr-TR" b="1" dirty="0">
                 <a:solidFill>
                   <a:srgbClr val="222222"/>
                 </a:solidFill>
@@ -10651,7 +10598,7 @@
               <a:t> ( kod noktası ) </a:t>
             </a:r>
             <a:r>
-              <a:rPr lang="tr-TR" dirty="0" smtClean="0">
+              <a:rPr lang="tr-TR" dirty="0">
                 <a:solidFill>
                   <a:srgbClr val="222222"/>
                 </a:solidFill>
@@ -10661,11 +10608,7 @@
             </a:r>
             <a:r>
               <a:rPr lang="tr-TR" dirty="0"/>
-              <a:t>Bir kod noktası, bir karakter oluşturan bir </a:t>
-            </a:r>
-            <a:r>
-              <a:rPr lang="tr-TR" dirty="0" smtClean="0"/>
-              <a:t>sayıdır.</a:t>
+              <a:t>Bir kod noktası, bir karakter oluşturan bir sayıdır.</a:t>
             </a:r>
           </a:p>
           <a:p>
@@ -10673,42 +10616,41 @@
           </a:p>
           <a:p>
             <a:r>
-              <a:rPr lang="tr-TR" sz="2400" b="1" dirty="0" err="1" smtClean="0"/>
+              <a:rPr lang="tr-TR" sz="2400" b="1" dirty="0" err="1"/>
               <a:t>Code</a:t>
             </a:r>
             <a:r>
-              <a:rPr lang="tr-TR" sz="2400" b="1" dirty="0" smtClean="0"/>
+              <a:rPr lang="tr-TR" sz="2400" b="1" dirty="0"/>
               <a:t> </a:t>
             </a:r>
             <a:r>
-              <a:rPr lang="tr-TR" sz="2400" b="1" dirty="0" err="1" smtClean="0"/>
+              <a:rPr lang="tr-TR" sz="2400" b="1" dirty="0" err="1"/>
               <a:t>page</a:t>
             </a:r>
             <a:r>
-              <a:rPr lang="tr-TR" sz="2400" b="1" dirty="0" smtClean="0"/>
+              <a:rPr lang="tr-TR" sz="2400" b="1" dirty="0"/>
               <a:t> </a:t>
             </a:r>
             <a:r>
-              <a:rPr lang="tr-TR" dirty="0" smtClean="0"/>
+              <a:rPr lang="tr-TR" dirty="0"/>
               <a:t>: </a:t>
             </a:r>
             <a:r>
-              <a:rPr lang="tr-TR" dirty="0" err="1" smtClean="0"/>
+              <a:rPr lang="tr-TR" dirty="0" err="1"/>
               <a:t>Code</a:t>
             </a:r>
             <a:r>
-              <a:rPr lang="tr-TR" dirty="0" smtClean="0"/>
+              <a:rPr lang="tr-TR" dirty="0"/>
               <a:t> </a:t>
             </a:r>
             <a:r>
-              <a:rPr lang="tr-TR" dirty="0" err="1" smtClean="0"/>
+              <a:rPr lang="tr-TR" dirty="0" err="1"/>
               <a:t>pointlerin</a:t>
             </a:r>
             <a:r>
-              <a:rPr lang="tr-TR" dirty="0" smtClean="0"/>
+              <a:rPr lang="tr-TR" dirty="0"/>
               <a:t> farklı diller için farklı şekillerde ayarlanmasıdır.</a:t>
             </a:r>
-            <a:endParaRPr lang="tr-TR" dirty="0"/>
           </a:p>
         </p:txBody>
       </p:sp>
@@ -10801,10 +10743,9 @@
           <a:lstStyle/>
           <a:p>
             <a:r>
-              <a:rPr lang="tr-TR" sz="2000" dirty="0" smtClean="0"/>
+              <a:rPr lang="tr-TR" sz="2000" dirty="0"/>
               <a:t>ASCII kodları</a:t>
             </a:r>
-            <a:endParaRPr lang="tr-TR" sz="2000" dirty="0"/>
           </a:p>
         </p:txBody>
       </p:sp>
@@ -12007,7 +11948,7 @@
           </a:p>
           <a:p>
             <a:r>
-              <a:rPr lang="tr-TR" sz="4800" dirty="0" err="1" smtClean="0"/>
+              <a:rPr lang="tr-TR" sz="4800" dirty="0" err="1"/>
               <a:t>except</a:t>
             </a:r>
             <a:r>
@@ -12018,13 +11959,8 @@
           <a:p>
             <a:r>
               <a:rPr lang="tr-TR" sz="4800" dirty="0"/>
-              <a:t>	hata olursa </a:t>
-            </a:r>
-            <a:r>
-              <a:rPr lang="tr-TR" sz="4800" dirty="0" smtClean="0"/>
-              <a:t>	kod</a:t>
-            </a:r>
-            <a:endParaRPr lang="tr-TR" sz="4800" dirty="0"/>
+              <a:t>	hata olursa 	kod</a:t>
+            </a:r>
           </a:p>
           <a:p>
             <a:endParaRPr lang="tr-TR" sz="4800" dirty="0"/>
@@ -12282,8 +12218,8 @@
         </p:nvSpPr>
         <p:spPr>
           <a:xfrm>
-            <a:off x="1852863" y="794084"/>
-            <a:ext cx="8269953" cy="4832092"/>
+            <a:off x="417959" y="864423"/>
+            <a:ext cx="5040306" cy="4832092"/>
           </a:xfrm>
           <a:prstGeom prst="rect">
             <a:avLst/>
@@ -12401,6 +12337,112 @@
           </a:p>
           <a:p>
             <a:endParaRPr lang="tr-TR" sz="2800" dirty="0"/>
+          </a:p>
+        </p:txBody>
+      </p:sp>
+      <p:sp>
+        <p:nvSpPr>
+          <p:cNvPr id="3" name="Metin kutusu 2">
+            <a:extLst>
+              <a:ext uri="{FF2B5EF4-FFF2-40B4-BE49-F238E27FC236}">
+                <a16:creationId xmlns:a16="http://schemas.microsoft.com/office/drawing/2014/main" id="{C696F761-AF82-48A5-B5CB-857D06D0F2F5}"/>
+              </a:ext>
+            </a:extLst>
+          </p:cNvPr>
+          <p:cNvSpPr txBox="1"/>
+          <p:nvPr/>
+        </p:nvSpPr>
+        <p:spPr>
+          <a:xfrm>
+            <a:off x="5458265" y="1161485"/>
+            <a:ext cx="6358597" cy="4401205"/>
+          </a:xfrm>
+          <a:prstGeom prst="rect">
+            <a:avLst/>
+          </a:prstGeom>
+          <a:noFill/>
+        </p:spPr>
+        <p:txBody>
+          <a:bodyPr wrap="square" rtlCol="0">
+            <a:spAutoFit/>
+          </a:bodyPr>
+          <a:lstStyle/>
+          <a:p>
+            <a:r>
+              <a:rPr lang="tr-TR" sz="2800" dirty="0"/>
+              <a:t>Oluşan hatanın mesajına ulaşmak için </a:t>
+            </a:r>
+            <a:r>
+              <a:rPr lang="tr-TR" sz="2800" b="1" dirty="0" err="1"/>
+              <a:t>hata_adı</a:t>
+            </a:r>
+            <a:r>
+              <a:rPr lang="tr-TR" sz="2800" b="1" dirty="0"/>
+              <a:t> as değişken_ adı</a:t>
+            </a:r>
+          </a:p>
+          <a:p>
+            <a:r>
+              <a:rPr lang="tr-TR" sz="2800" dirty="0"/>
+              <a:t>yapısı kullanılır. Örnekteki </a:t>
+            </a:r>
+            <a:r>
+              <a:rPr lang="tr-TR" sz="2800" b="1" dirty="0"/>
+              <a:t>Exception as hata</a:t>
+            </a:r>
+            <a:r>
+              <a:rPr lang="tr-TR" sz="2800" dirty="0"/>
+              <a:t> gibi</a:t>
+            </a:r>
+          </a:p>
+          <a:p>
+            <a:endParaRPr lang="tr-TR" sz="2800" dirty="0"/>
+          </a:p>
+          <a:p>
+            <a:r>
+              <a:rPr lang="tr-TR" sz="2800" dirty="0"/>
+              <a:t>a = 15</a:t>
+            </a:r>
+          </a:p>
+          <a:p>
+            <a:r>
+              <a:rPr lang="tr-TR" sz="2800" dirty="0" err="1"/>
+              <a:t>try</a:t>
+            </a:r>
+            <a:r>
+              <a:rPr lang="tr-TR" sz="2800" dirty="0"/>
+              <a:t>:</a:t>
+            </a:r>
+          </a:p>
+          <a:p>
+            <a:r>
+              <a:rPr lang="tr-TR" sz="2800" dirty="0"/>
+              <a:t>       b = 15 / 0</a:t>
+            </a:r>
+          </a:p>
+          <a:p>
+            <a:r>
+              <a:rPr lang="tr-TR" sz="2800" dirty="0" err="1"/>
+              <a:t>except</a:t>
+            </a:r>
+            <a:r>
+              <a:rPr lang="tr-TR" sz="2800" dirty="0"/>
+              <a:t> Exception as hata:</a:t>
+            </a:r>
+          </a:p>
+          <a:p>
+            <a:r>
+              <a:rPr lang="tr-TR" sz="2800" dirty="0"/>
+              <a:t>       </a:t>
+            </a:r>
+            <a:r>
+              <a:rPr lang="tr-TR" sz="2800" dirty="0" err="1"/>
+              <a:t>print</a:t>
+            </a:r>
+            <a:r>
+              <a:rPr lang="tr-TR" sz="2800" dirty="0"/>
+              <a:t>(hata)</a:t>
+            </a:r>
           </a:p>
         </p:txBody>
       </p:sp>
@@ -12487,7 +12529,7 @@
           <a:p>
             <a:pPr algn="l"/>
             <a:r>
-              <a:rPr lang="tr-TR" sz="4800" b="0" i="0" dirty="0" smtClean="0">
+              <a:rPr lang="tr-TR" sz="4800" b="0" i="0" dirty="0">
                 <a:solidFill>
                   <a:srgbClr val="000000"/>
                 </a:solidFill>
@@ -12497,7 +12539,7 @@
               <a:t>	</a:t>
             </a:r>
             <a:r>
-              <a:rPr lang="tr-TR" sz="4800" b="0" i="0" dirty="0" err="1" smtClean="0">
+              <a:rPr lang="tr-TR" sz="4800" b="0" i="0" dirty="0" err="1">
                 <a:solidFill>
                   <a:srgbClr val="000000"/>
                 </a:solidFill>
@@ -12507,7 +12549,7 @@
               <a:t>code</a:t>
             </a:r>
             <a:r>
-              <a:rPr lang="tr-TR" sz="4800" b="0" i="0" dirty="0" smtClean="0">
+              <a:rPr lang="tr-TR" sz="4800" b="0" i="0" dirty="0">
                 <a:solidFill>
                   <a:srgbClr val="000000"/>
                 </a:solidFill>
@@ -12516,13 +12558,6 @@
               </a:rPr>
               <a:t> </a:t>
             </a:r>
-            <a:endParaRPr lang="tr-TR" sz="4800" b="0" i="0" dirty="0">
-              <a:solidFill>
-                <a:srgbClr val="000000"/>
-              </a:solidFill>
-              <a:effectLst/>
-              <a:latin typeface="courier new" panose="02070309020205020404" pitchFamily="49" charset="0"/>
-            </a:endParaRPr>
           </a:p>
           <a:p>
             <a:pPr algn="l"/>
@@ -12559,7 +12594,7 @@
               <a:t>	</a:t>
             </a:r>
             <a:r>
-              <a:rPr lang="tr-TR" sz="4800" dirty="0" err="1" smtClean="0">
+              <a:rPr lang="tr-TR" sz="4800" dirty="0" err="1">
                 <a:solidFill>
                   <a:srgbClr val="000000"/>
                 </a:solidFill>
@@ -15030,11 +15065,7 @@
             </a:r>
             <a:r>
               <a:rPr lang="tr-TR" sz="2400" b="1"/>
-              <a:t>ad </a:t>
-            </a:r>
-            <a:r>
-              <a:rPr lang="tr-TR" sz="2400" b="1" smtClean="0"/>
-              <a:t>uzayı-alanı </a:t>
+              <a:t>ad uzayı-alanı </a:t>
             </a:r>
             <a:r>
               <a:rPr lang="tr-TR" sz="2400" b="1" dirty="0"/>

</xml_diff>